<commit_message>
fixed typos and awkward sentences in chapter 1
</commit_message>
<xml_diff>
--- a/Source/chapters/01.HeteroComp/figures/GPU.pptx
+++ b/Source/chapters/01.HeteroComp/figures/GPU.pptx
@@ -5,13 +5,14 @@
     <p:sldMasterId id="2147483648" r:id="rId1"/>
   </p:sldMasterIdLst>
   <p:notesMasterIdLst>
-    <p:notesMasterId r:id="rId6"/>
+    <p:notesMasterId r:id="rId7"/>
   </p:notesMasterIdLst>
   <p:sldIdLst>
     <p:sldId id="258" r:id="rId2"/>
-    <p:sldId id="259" r:id="rId3"/>
-    <p:sldId id="257" r:id="rId4"/>
-    <p:sldId id="256" r:id="rId5"/>
+    <p:sldId id="260" r:id="rId3"/>
+    <p:sldId id="259" r:id="rId4"/>
+    <p:sldId id="257" r:id="rId5"/>
+    <p:sldId id="256" r:id="rId6"/>
   </p:sldIdLst>
   <p:sldSz cx="12192000" cy="6858000"/>
   <p:notesSz cx="6858000" cy="9144000"/>
@@ -211,7 +212,7 @@
           <a:p>
             <a:fld id="{3E248CC4-C781-3042-BCC4-4143E3C28A61}" type="datetimeFigureOut">
               <a:rPr lang="en-US" smtClean="0"/>
-              <a:t>4/1/21</a:t>
+              <a:t>4/11/21</a:t>
             </a:fld>
             <a:endParaRPr lang="en-US"/>
           </a:p>
@@ -709,7 +710,7 @@
           <a:p>
             <a:fld id="{4B3C81F5-6E38-F143-A0F0-C9AF46A94FC5}" type="datetimeFigureOut">
               <a:rPr lang="en-US" smtClean="0"/>
-              <a:t>4/1/21</a:t>
+              <a:t>4/11/21</a:t>
             </a:fld>
             <a:endParaRPr lang="en-US"/>
           </a:p>
@@ -907,7 +908,7 @@
           <a:p>
             <a:fld id="{4B3C81F5-6E38-F143-A0F0-C9AF46A94FC5}" type="datetimeFigureOut">
               <a:rPr lang="en-US" smtClean="0"/>
-              <a:t>4/1/21</a:t>
+              <a:t>4/11/21</a:t>
             </a:fld>
             <a:endParaRPr lang="en-US"/>
           </a:p>
@@ -1115,7 +1116,7 @@
           <a:p>
             <a:fld id="{4B3C81F5-6E38-F143-A0F0-C9AF46A94FC5}" type="datetimeFigureOut">
               <a:rPr lang="en-US" smtClean="0"/>
-              <a:t>4/1/21</a:t>
+              <a:t>4/11/21</a:t>
             </a:fld>
             <a:endParaRPr lang="en-US"/>
           </a:p>
@@ -1313,7 +1314,7 @@
           <a:p>
             <a:fld id="{4B3C81F5-6E38-F143-A0F0-C9AF46A94FC5}" type="datetimeFigureOut">
               <a:rPr lang="en-US" smtClean="0"/>
-              <a:t>4/1/21</a:t>
+              <a:t>4/11/21</a:t>
             </a:fld>
             <a:endParaRPr lang="en-US"/>
           </a:p>
@@ -1588,7 +1589,7 @@
           <a:p>
             <a:fld id="{4B3C81F5-6E38-F143-A0F0-C9AF46A94FC5}" type="datetimeFigureOut">
               <a:rPr lang="en-US" smtClean="0"/>
-              <a:t>4/1/21</a:t>
+              <a:t>4/11/21</a:t>
             </a:fld>
             <a:endParaRPr lang="en-US"/>
           </a:p>
@@ -1853,7 +1854,7 @@
           <a:p>
             <a:fld id="{4B3C81F5-6E38-F143-A0F0-C9AF46A94FC5}" type="datetimeFigureOut">
               <a:rPr lang="en-US" smtClean="0"/>
-              <a:t>4/1/21</a:t>
+              <a:t>4/11/21</a:t>
             </a:fld>
             <a:endParaRPr lang="en-US"/>
           </a:p>
@@ -2265,7 +2266,7 @@
           <a:p>
             <a:fld id="{4B3C81F5-6E38-F143-A0F0-C9AF46A94FC5}" type="datetimeFigureOut">
               <a:rPr lang="en-US" smtClean="0"/>
-              <a:t>4/1/21</a:t>
+              <a:t>4/11/21</a:t>
             </a:fld>
             <a:endParaRPr lang="en-US"/>
           </a:p>
@@ -2406,7 +2407,7 @@
           <a:p>
             <a:fld id="{4B3C81F5-6E38-F143-A0F0-C9AF46A94FC5}" type="datetimeFigureOut">
               <a:rPr lang="en-US" smtClean="0"/>
-              <a:t>4/1/21</a:t>
+              <a:t>4/11/21</a:t>
             </a:fld>
             <a:endParaRPr lang="en-US"/>
           </a:p>
@@ -2519,7 +2520,7 @@
           <a:p>
             <a:fld id="{4B3C81F5-6E38-F143-A0F0-C9AF46A94FC5}" type="datetimeFigureOut">
               <a:rPr lang="en-US" smtClean="0"/>
-              <a:t>4/1/21</a:t>
+              <a:t>4/11/21</a:t>
             </a:fld>
             <a:endParaRPr lang="en-US"/>
           </a:p>
@@ -2830,7 +2831,7 @@
           <a:p>
             <a:fld id="{4B3C81F5-6E38-F143-A0F0-C9AF46A94FC5}" type="datetimeFigureOut">
               <a:rPr lang="en-US" smtClean="0"/>
-              <a:t>4/1/21</a:t>
+              <a:t>4/11/21</a:t>
             </a:fld>
             <a:endParaRPr lang="en-US"/>
           </a:p>
@@ -3118,7 +3119,7 @@
           <a:p>
             <a:fld id="{4B3C81F5-6E38-F143-A0F0-C9AF46A94FC5}" type="datetimeFigureOut">
               <a:rPr lang="en-US" smtClean="0"/>
-              <a:t>4/1/21</a:t>
+              <a:t>4/11/21</a:t>
             </a:fld>
             <a:endParaRPr lang="en-US"/>
           </a:p>
@@ -3359,7 +3360,7 @@
           <a:p>
             <a:fld id="{4B3C81F5-6E38-F143-A0F0-C9AF46A94FC5}" type="datetimeFigureOut">
               <a:rPr lang="en-US" smtClean="0"/>
-              <a:t>4/1/21</a:t>
+              <a:t>4/11/21</a:t>
             </a:fld>
             <a:endParaRPr lang="en-US"/>
           </a:p>
@@ -6297,12 +6298,216 @@
           <a:chExt cx="0" cy="0"/>
         </a:xfrm>
       </p:grpSpPr>
-      <p:sp>
-        <p:nvSpPr>
-          <p:cNvPr id="2" name="TextBox 1">
-            <a:extLst>
-              <a:ext uri="{FF2B5EF4-FFF2-40B4-BE49-F238E27FC236}">
-                <a16:creationId xmlns:a16="http://schemas.microsoft.com/office/drawing/2014/main" id="{64C5774C-2EE8-174D-B9C1-DB8ED86F19F4}"/>
+      <p:pic>
+        <p:nvPicPr>
+          <p:cNvPr id="3" name="Picture 2" descr="Diagram&#10;&#10;Description automatically generated">
+            <a:extLst>
+              <a:ext uri="{FF2B5EF4-FFF2-40B4-BE49-F238E27FC236}">
+                <a16:creationId xmlns:a16="http://schemas.microsoft.com/office/drawing/2014/main" id="{CF7A37A9-971E-9E4D-B60D-704DEAE8929E}"/>
+              </a:ext>
+            </a:extLst>
+          </p:cNvPr>
+          <p:cNvPicPr>
+            <a:picLocks noChangeAspect="1"/>
+          </p:cNvPicPr>
+          <p:nvPr/>
+        </p:nvPicPr>
+        <p:blipFill>
+          <a:blip r:embed="rId2"/>
+          <a:stretch>
+            <a:fillRect/>
+          </a:stretch>
+        </p:blipFill>
+        <p:spPr>
+          <a:xfrm>
+            <a:off x="7334456" y="1140561"/>
+            <a:ext cx="3713946" cy="865385"/>
+          </a:xfrm>
+          <a:prstGeom prst="rect">
+            <a:avLst/>
+          </a:prstGeom>
+        </p:spPr>
+      </p:pic>
+      <p:pic>
+        <p:nvPicPr>
+          <p:cNvPr id="5" name="Picture 4">
+            <a:extLst>
+              <a:ext uri="{FF2B5EF4-FFF2-40B4-BE49-F238E27FC236}">
+                <a16:creationId xmlns:a16="http://schemas.microsoft.com/office/drawing/2014/main" id="{36369A36-D204-A849-9947-1D6B8D4409A5}"/>
+              </a:ext>
+            </a:extLst>
+          </p:cNvPr>
+          <p:cNvPicPr>
+            <a:picLocks noChangeAspect="1"/>
+          </p:cNvPicPr>
+          <p:nvPr/>
+        </p:nvPicPr>
+        <p:blipFill>
+          <a:blip r:embed="rId3"/>
+          <a:stretch>
+            <a:fillRect/>
+          </a:stretch>
+        </p:blipFill>
+        <p:spPr>
+          <a:xfrm>
+            <a:off x="545538" y="982883"/>
+            <a:ext cx="4985866" cy="5654233"/>
+          </a:xfrm>
+          <a:prstGeom prst="rect">
+            <a:avLst/>
+          </a:prstGeom>
+        </p:spPr>
+      </p:pic>
+      <p:sp>
+        <p:nvSpPr>
+          <p:cNvPr id="6" name="Rectangle 5">
+            <a:extLst>
+              <a:ext uri="{FF2B5EF4-FFF2-40B4-BE49-F238E27FC236}">
+                <a16:creationId xmlns:a16="http://schemas.microsoft.com/office/drawing/2014/main" id="{320407ED-7589-BD40-8B2E-C78AE0469035}"/>
+              </a:ext>
+            </a:extLst>
+          </p:cNvPr>
+          <p:cNvSpPr/>
+          <p:nvPr/>
+        </p:nvSpPr>
+        <p:spPr>
+          <a:xfrm>
+            <a:off x="347241" y="827018"/>
+            <a:ext cx="5660020" cy="5886298"/>
+          </a:xfrm>
+          <a:prstGeom prst="rect">
+            <a:avLst/>
+          </a:prstGeom>
+          <a:noFill/>
+          <a:ln w="28575">
+            <a:solidFill>
+              <a:schemeClr val="tx1"/>
+            </a:solidFill>
+          </a:ln>
+        </p:spPr>
+        <p:style>
+          <a:lnRef idx="2">
+            <a:schemeClr val="accent1">
+              <a:shade val="50000"/>
+            </a:schemeClr>
+          </a:lnRef>
+          <a:fillRef idx="1">
+            <a:schemeClr val="accent1"/>
+          </a:fillRef>
+          <a:effectRef idx="0">
+            <a:schemeClr val="accent1"/>
+          </a:effectRef>
+          <a:fontRef idx="minor">
+            <a:schemeClr val="lt1"/>
+          </a:fontRef>
+        </p:style>
+        <p:txBody>
+          <a:bodyPr rtlCol="0" anchor="ctr"/>
+          <a:lstStyle/>
+          <a:p>
+            <a:pPr algn="ctr"/>
+            <a:endParaRPr lang="en-US"/>
+          </a:p>
+        </p:txBody>
+      </p:sp>
+      <p:sp>
+        <p:nvSpPr>
+          <p:cNvPr id="7" name="Rectangle 6">
+            <a:extLst>
+              <a:ext uri="{FF2B5EF4-FFF2-40B4-BE49-F238E27FC236}">
+                <a16:creationId xmlns:a16="http://schemas.microsoft.com/office/drawing/2014/main" id="{C3803102-AB7A-3E40-8C29-BC9C85819F72}"/>
+              </a:ext>
+            </a:extLst>
+          </p:cNvPr>
+          <p:cNvSpPr/>
+          <p:nvPr/>
+        </p:nvSpPr>
+        <p:spPr>
+          <a:xfrm>
+            <a:off x="6858599" y="868080"/>
+            <a:ext cx="4272655" cy="1238265"/>
+          </a:xfrm>
+          <a:prstGeom prst="rect">
+            <a:avLst/>
+          </a:prstGeom>
+          <a:noFill/>
+          <a:ln w="28575">
+            <a:solidFill>
+              <a:schemeClr val="tx1"/>
+            </a:solidFill>
+          </a:ln>
+        </p:spPr>
+        <p:style>
+          <a:lnRef idx="2">
+            <a:schemeClr val="accent1">
+              <a:shade val="50000"/>
+            </a:schemeClr>
+          </a:lnRef>
+          <a:fillRef idx="1">
+            <a:schemeClr val="accent1"/>
+          </a:fillRef>
+          <a:effectRef idx="0">
+            <a:schemeClr val="accent1"/>
+          </a:effectRef>
+          <a:fontRef idx="minor">
+            <a:schemeClr val="lt1"/>
+          </a:fontRef>
+        </p:style>
+        <p:txBody>
+          <a:bodyPr rtlCol="0" anchor="ctr"/>
+          <a:lstStyle/>
+          <a:p>
+            <a:pPr algn="ctr"/>
+            <a:endParaRPr lang="en-US"/>
+          </a:p>
+        </p:txBody>
+      </p:sp>
+      <p:cxnSp>
+        <p:nvCxnSpPr>
+          <p:cNvPr id="9" name="Straight Arrow Connector 8">
+            <a:extLst>
+              <a:ext uri="{FF2B5EF4-FFF2-40B4-BE49-F238E27FC236}">
+                <a16:creationId xmlns:a16="http://schemas.microsoft.com/office/drawing/2014/main" id="{AEBB8C90-F69A-3349-9E14-A9F89512DD9B}"/>
+              </a:ext>
+            </a:extLst>
+          </p:cNvPr>
+          <p:cNvCxnSpPr/>
+          <p:nvPr/>
+        </p:nvCxnSpPr>
+        <p:spPr>
+          <a:xfrm flipH="1">
+            <a:off x="6007261" y="1487213"/>
+            <a:ext cx="851338" cy="0"/>
+          </a:xfrm>
+          <a:prstGeom prst="straightConnector1">
+            <a:avLst/>
+          </a:prstGeom>
+          <a:ln w="57150">
+            <a:headEnd type="triangle"/>
+            <a:tailEnd type="triangle"/>
+          </a:ln>
+        </p:spPr>
+        <p:style>
+          <a:lnRef idx="1">
+            <a:schemeClr val="accent1"/>
+          </a:lnRef>
+          <a:fillRef idx="0">
+            <a:schemeClr val="accent1"/>
+          </a:fillRef>
+          <a:effectRef idx="0">
+            <a:schemeClr val="accent1"/>
+          </a:effectRef>
+          <a:fontRef idx="minor">
+            <a:schemeClr val="tx1"/>
+          </a:fontRef>
+        </p:style>
+      </p:cxnSp>
+      <p:sp>
+        <p:nvSpPr>
+          <p:cNvPr id="10" name="TextBox 9">
+            <a:extLst>
+              <a:ext uri="{FF2B5EF4-FFF2-40B4-BE49-F238E27FC236}">
+                <a16:creationId xmlns:a16="http://schemas.microsoft.com/office/drawing/2014/main" id="{657D6130-C600-2D48-B64F-B4FA434B8742}"/>
               </a:ext>
             </a:extLst>
           </p:cNvPr>
@@ -6311,8 +6516,8 @@
         </p:nvSpPr>
         <p:spPr>
           <a:xfrm>
-            <a:off x="3993931" y="1250731"/>
-            <a:ext cx="4204138" cy="369332"/>
+            <a:off x="6858599" y="895524"/>
+            <a:ext cx="1135118" cy="307777"/>
           </a:xfrm>
           <a:prstGeom prst="rect">
             <a:avLst/>
@@ -6326,40 +6531,8 @@
           <a:lstStyle/>
           <a:p>
             <a:r>
-              <a:rPr lang="en-US" dirty="0"/>
-              <a:t>__mm256d Avec, </a:t>
-            </a:r>
-            <a:r>
-              <a:rPr lang="en-US" dirty="0" err="1"/>
-              <a:t>Bvec</a:t>
-            </a:r>
-            <a:r>
-              <a:rPr lang="en-US" dirty="0"/>
-              <a:t>, </a:t>
-            </a:r>
-            <a:r>
-              <a:rPr lang="en-US" dirty="0" err="1"/>
-              <a:t>Cvec</a:t>
-            </a:r>
-            <a:r>
-              <a:rPr lang="en-US" dirty="0"/>
-              <a:t>, </a:t>
-            </a:r>
-            <a:r>
-              <a:rPr lang="en-US" dirty="0" err="1"/>
-              <a:t>Dvec</a:t>
-            </a:r>
-            <a:r>
-              <a:rPr lang="en-US" dirty="0"/>
-              <a:t>, </a:t>
-            </a:r>
-            <a:r>
-              <a:rPr lang="en-US" dirty="0" err="1"/>
-              <a:t>Evec</a:t>
-            </a:r>
-            <a:r>
-              <a:rPr lang="en-US" dirty="0"/>
-              <a:t>;</a:t>
+              <a:rPr lang="en-US" sz="1400" dirty="0"/>
+              <a:t>Host</a:t>
             </a:r>
           </a:p>
         </p:txBody>
@@ -6367,7 +6540,7 @@
     </p:spTree>
     <p:extLst>
       <p:ext uri="{BB962C8B-B14F-4D97-AF65-F5344CB8AC3E}">
-        <p14:creationId xmlns:p14="http://schemas.microsoft.com/office/powerpoint/2010/main" val="375202607"/>
+        <p14:creationId xmlns:p14="http://schemas.microsoft.com/office/powerpoint/2010/main" val="3511967402"/>
       </p:ext>
     </p:extLst>
   </p:cSld>
@@ -6396,6 +6569,103 @@
       </p:grpSpPr>
       <p:sp>
         <p:nvSpPr>
+          <p:cNvPr id="2" name="TextBox 1">
+            <a:extLst>
+              <a:ext uri="{FF2B5EF4-FFF2-40B4-BE49-F238E27FC236}">
+                <a16:creationId xmlns:a16="http://schemas.microsoft.com/office/drawing/2014/main" id="{64C5774C-2EE8-174D-B9C1-DB8ED86F19F4}"/>
+              </a:ext>
+            </a:extLst>
+          </p:cNvPr>
+          <p:cNvSpPr txBox="1"/>
+          <p:nvPr/>
+        </p:nvSpPr>
+        <p:spPr>
+          <a:xfrm>
+            <a:off x="3993931" y="1250731"/>
+            <a:ext cx="4204138" cy="369332"/>
+          </a:xfrm>
+          <a:prstGeom prst="rect">
+            <a:avLst/>
+          </a:prstGeom>
+          <a:noFill/>
+        </p:spPr>
+        <p:txBody>
+          <a:bodyPr wrap="square" rtlCol="0">
+            <a:spAutoFit/>
+          </a:bodyPr>
+          <a:lstStyle/>
+          <a:p>
+            <a:r>
+              <a:rPr lang="en-US" dirty="0"/>
+              <a:t>__mm256d Avec, </a:t>
+            </a:r>
+            <a:r>
+              <a:rPr lang="en-US" dirty="0" err="1"/>
+              <a:t>Bvec</a:t>
+            </a:r>
+            <a:r>
+              <a:rPr lang="en-US" dirty="0"/>
+              <a:t>, </a:t>
+            </a:r>
+            <a:r>
+              <a:rPr lang="en-US" dirty="0" err="1"/>
+              <a:t>Cvec</a:t>
+            </a:r>
+            <a:r>
+              <a:rPr lang="en-US" dirty="0"/>
+              <a:t>, </a:t>
+            </a:r>
+            <a:r>
+              <a:rPr lang="en-US" dirty="0" err="1"/>
+              <a:t>Dvec</a:t>
+            </a:r>
+            <a:r>
+              <a:rPr lang="en-US" dirty="0"/>
+              <a:t>, </a:t>
+            </a:r>
+            <a:r>
+              <a:rPr lang="en-US" dirty="0" err="1"/>
+              <a:t>Evec</a:t>
+            </a:r>
+            <a:r>
+              <a:rPr lang="en-US" dirty="0"/>
+              <a:t>;</a:t>
+            </a:r>
+          </a:p>
+        </p:txBody>
+      </p:sp>
+    </p:spTree>
+    <p:extLst>
+      <p:ext uri="{BB962C8B-B14F-4D97-AF65-F5344CB8AC3E}">
+        <p14:creationId xmlns:p14="http://schemas.microsoft.com/office/powerpoint/2010/main" val="375202607"/>
+      </p:ext>
+    </p:extLst>
+  </p:cSld>
+  <p:clrMapOvr>
+    <a:masterClrMapping/>
+  </p:clrMapOvr>
+</p:sld>
+</file>
+
+<file path=ppt/slides/slide4.xml><?xml version="1.0" encoding="utf-8"?>
+<p:sld xmlns:a="http://schemas.openxmlformats.org/drawingml/2006/main" xmlns:r="http://schemas.openxmlformats.org/officeDocument/2006/relationships" xmlns:p="http://schemas.openxmlformats.org/presentationml/2006/main">
+  <p:cSld>
+    <p:spTree>
+      <p:nvGrpSpPr>
+        <p:cNvPr id="1" name=""/>
+        <p:cNvGrpSpPr/>
+        <p:nvPr/>
+      </p:nvGrpSpPr>
+      <p:grpSpPr>
+        <a:xfrm>
+          <a:off x="0" y="0"/>
+          <a:ext cx="0" cy="0"/>
+          <a:chOff x="0" y="0"/>
+          <a:chExt cx="0" cy="0"/>
+        </a:xfrm>
+      </p:grpSpPr>
+      <p:sp>
+        <p:nvSpPr>
           <p:cNvPr id="4" name="TextBox 3">
             <a:extLst>
               <a:ext uri="{FF2B5EF4-FFF2-40B4-BE49-F238E27FC236}">
@@ -8315,7 +8585,7 @@
 </p:sld>
 </file>
 
-<file path=ppt/slides/slide4.xml><?xml version="1.0" encoding="utf-8"?>
+<file path=ppt/slides/slide5.xml><?xml version="1.0" encoding="utf-8"?>
 <p:sld xmlns:a="http://schemas.openxmlformats.org/drawingml/2006/main" xmlns:r="http://schemas.openxmlformats.org/officeDocument/2006/relationships" xmlns:p="http://schemas.openxmlformats.org/presentationml/2006/main">
   <p:cSld>
     <p:spTree>

</xml_diff>